<commit_message>
added demo code for exception handle
</commit_message>
<xml_diff>
--- a/FirstDemo/SpringBootIntroduction.pptx
+++ b/FirstDemo/SpringBootIntroduction.pptx
@@ -5,12 +5,20 @@
     <p:sldMasterId id="2147483648" r:id="rId1"/>
   </p:sldMasterIdLst>
   <p:notesMasterIdLst>
-    <p:notesMasterId r:id="rId6"/>
+    <p:notesMasterId r:id="rId9"/>
   </p:notesMasterIdLst>
   <p:sldIdLst>
     <p:sldId id="256" r:id="rId3"/>
     <p:sldId id="257" r:id="rId4"/>
     <p:sldId id="260" r:id="rId5"/>
+    <p:sldId id="261" r:id="rId6"/>
+    <p:sldId id="262" r:id="rId7"/>
+    <p:sldId id="263" r:id="rId8"/>
+    <p:sldId id="264" r:id="rId10"/>
+    <p:sldId id="265" r:id="rId11"/>
+    <p:sldId id="266" r:id="rId12"/>
+    <p:sldId id="267" r:id="rId13"/>
+    <p:sldId id="268" r:id="rId14"/>
   </p:sldIdLst>
   <p:sldSz cx="12192000" cy="6858000"/>
   <p:notesSz cx="6858000" cy="9144000"/>
@@ -457,6 +465,247 @@
     </a:lvl9pPr>
   </p:notesStyle>
 </p:notesMaster>
+</file>
+
+<file path=ppt/notesSlides/notesSlide1.xml><?xml version="1.0" encoding="utf-8"?>
+<p:notes xmlns:a="http://schemas.openxmlformats.org/drawingml/2006/main" xmlns:r="http://schemas.openxmlformats.org/officeDocument/2006/relationships" xmlns:p="http://schemas.openxmlformats.org/presentationml/2006/main">
+  <p:cSld>
+    <p:spTree>
+      <p:nvGrpSpPr>
+        <p:cNvPr id="1" name=""/>
+        <p:cNvGrpSpPr/>
+        <p:nvPr/>
+      </p:nvGrpSpPr>
+      <p:grpSpPr/>
+      <p:sp>
+        <p:nvSpPr>
+          <p:cNvPr id="2" name="幻灯片图像占位符 1"/>
+          <p:cNvSpPr/>
+          <p:nvPr>
+            <p:ph type="sldImg" idx="2"/>
+          </p:nvPr>
+        </p:nvSpPr>
+        <p:spPr/>
+      </p:sp>
+      <p:sp>
+        <p:nvSpPr>
+          <p:cNvPr id="3" name="文本占位符 2"/>
+          <p:cNvSpPr/>
+          <p:nvPr>
+            <p:ph type="body" idx="3"/>
+          </p:nvPr>
+        </p:nvSpPr>
+        <p:spPr/>
+        <p:txBody>
+          <a:bodyPr/>
+          <a:p>
+            <a:r>
+              <a:rPr lang="en-US" altLang="zh-CN"/>
+              <a:t>chain.doFilter(request, response): to process the next filter</a:t>
+            </a:r>
+            <a:endParaRPr lang="en-US" altLang="zh-CN"/>
+          </a:p>
+        </p:txBody>
+      </p:sp>
+    </p:spTree>
+  </p:cSld>
+  <p:clrMapOvr>
+    <a:masterClrMapping/>
+  </p:clrMapOvr>
+</p:notes>
+</file>
+
+<file path=ppt/notesSlides/notesSlide2.xml><?xml version="1.0" encoding="utf-8"?>
+<p:notes xmlns:a="http://schemas.openxmlformats.org/drawingml/2006/main" xmlns:r="http://schemas.openxmlformats.org/officeDocument/2006/relationships" xmlns:p="http://schemas.openxmlformats.org/presentationml/2006/main">
+  <p:cSld>
+    <p:spTree>
+      <p:nvGrpSpPr>
+        <p:cNvPr id="1" name=""/>
+        <p:cNvGrpSpPr/>
+        <p:nvPr/>
+      </p:nvGrpSpPr>
+      <p:grpSpPr/>
+      <p:sp>
+        <p:nvSpPr>
+          <p:cNvPr id="2" name="幻灯片图像占位符 1"/>
+          <p:cNvSpPr/>
+          <p:nvPr>
+            <p:ph type="sldImg" idx="2"/>
+          </p:nvPr>
+        </p:nvSpPr>
+        <p:spPr/>
+      </p:sp>
+      <p:sp>
+        <p:nvSpPr>
+          <p:cNvPr id="3" name="文本占位符 2"/>
+          <p:cNvSpPr/>
+          <p:nvPr>
+            <p:ph type="body" idx="3"/>
+          </p:nvPr>
+        </p:nvSpPr>
+        <p:spPr/>
+        <p:txBody>
+          <a:bodyPr/>
+          <a:p>
+            <a:endParaRPr lang="zh-CN" altLang="en-US"/>
+          </a:p>
+        </p:txBody>
+      </p:sp>
+    </p:spTree>
+  </p:cSld>
+  <p:clrMapOvr>
+    <a:masterClrMapping/>
+  </p:clrMapOvr>
+</p:notes>
+</file>
+
+<file path=ppt/notesSlides/notesSlide3.xml><?xml version="1.0" encoding="utf-8"?>
+<p:notes xmlns:a="http://schemas.openxmlformats.org/drawingml/2006/main" xmlns:r="http://schemas.openxmlformats.org/officeDocument/2006/relationships" xmlns:p="http://schemas.openxmlformats.org/presentationml/2006/main">
+  <p:cSld>
+    <p:spTree>
+      <p:nvGrpSpPr>
+        <p:cNvPr id="1" name=""/>
+        <p:cNvGrpSpPr/>
+        <p:nvPr/>
+      </p:nvGrpSpPr>
+      <p:grpSpPr/>
+      <p:sp>
+        <p:nvSpPr>
+          <p:cNvPr id="2" name="幻灯片图像占位符 1"/>
+          <p:cNvSpPr/>
+          <p:nvPr>
+            <p:ph type="sldImg" idx="2"/>
+          </p:nvPr>
+        </p:nvSpPr>
+        <p:spPr/>
+      </p:sp>
+      <p:sp>
+        <p:nvSpPr>
+          <p:cNvPr id="3" name="文本占位符 2"/>
+          <p:cNvSpPr/>
+          <p:nvPr>
+            <p:ph type="body" idx="3"/>
+          </p:nvPr>
+        </p:nvSpPr>
+        <p:spPr/>
+        <p:txBody>
+          <a:bodyPr/>
+          <a:p>
+            <a:r>
+              <a:rPr lang="en-US" altLang="zh-CN"/>
+              <a:t>preHandler: </a:t>
+            </a:r>
+            <a:r>
+              <a:rPr lang="zh-CN" altLang="en-US"/>
+              <a:t>在</a:t>
+            </a:r>
+            <a:r>
+              <a:rPr lang="en-US" altLang="zh-CN"/>
+              <a:t>Controller</a:t>
+            </a:r>
+            <a:r>
+              <a:rPr lang="zh-CN" altLang="en-US"/>
+              <a:t>方法执行之前调用</a:t>
+            </a:r>
+            <a:endParaRPr lang="zh-CN" altLang="en-US"/>
+          </a:p>
+          <a:p>
+            <a:r>
+              <a:rPr lang="en-US" altLang="zh-CN"/>
+              <a:t>postHandler: </a:t>
+            </a:r>
+            <a:r>
+              <a:rPr lang="zh-CN" altLang="en-US"/>
+              <a:t>在</a:t>
+            </a:r>
+            <a:r>
+              <a:rPr lang="en-US" altLang="zh-CN"/>
+              <a:t>Controller</a:t>
+            </a:r>
+            <a:r>
+              <a:rPr lang="zh-CN" altLang="en-US"/>
+              <a:t>方法执行之后若无异常则调用</a:t>
+            </a:r>
+            <a:endParaRPr lang="zh-CN" altLang="en-US"/>
+          </a:p>
+          <a:p>
+            <a:r>
+              <a:rPr lang="en-US" altLang="zh-CN"/>
+              <a:t>afterCompletion: </a:t>
+            </a:r>
+            <a:r>
+              <a:rPr lang="zh-CN" altLang="en-US"/>
+              <a:t>无论是否有异常最后调用 </a:t>
+            </a:r>
+            <a:endParaRPr lang="zh-CN" altLang="en-US"/>
+          </a:p>
+          <a:p>
+            <a:endParaRPr lang="zh-CN" altLang="en-US"/>
+          </a:p>
+        </p:txBody>
+      </p:sp>
+    </p:spTree>
+  </p:cSld>
+  <p:clrMapOvr>
+    <a:masterClrMapping/>
+  </p:clrMapOvr>
+</p:notes>
+</file>
+
+<file path=ppt/notesSlides/notesSlide4.xml><?xml version="1.0" encoding="utf-8"?>
+<p:notes xmlns:a="http://schemas.openxmlformats.org/drawingml/2006/main" xmlns:r="http://schemas.openxmlformats.org/officeDocument/2006/relationships" xmlns:p="http://schemas.openxmlformats.org/presentationml/2006/main">
+  <p:cSld>
+    <p:spTree>
+      <p:nvGrpSpPr>
+        <p:cNvPr id="1" name=""/>
+        <p:cNvGrpSpPr/>
+        <p:nvPr/>
+      </p:nvGrpSpPr>
+      <p:grpSpPr/>
+      <p:sp>
+        <p:nvSpPr>
+          <p:cNvPr id="2" name="幻灯片图像占位符 1"/>
+          <p:cNvSpPr/>
+          <p:nvPr>
+            <p:ph type="sldImg" idx="2"/>
+          </p:nvPr>
+        </p:nvSpPr>
+        <p:spPr/>
+      </p:sp>
+      <p:sp>
+        <p:nvSpPr>
+          <p:cNvPr id="3" name="文本占位符 2"/>
+          <p:cNvSpPr/>
+          <p:nvPr>
+            <p:ph type="body" idx="3"/>
+          </p:nvPr>
+        </p:nvSpPr>
+        <p:spPr/>
+        <p:txBody>
+          <a:bodyPr/>
+          <a:p>
+            <a:r>
+              <a:rPr lang="zh-CN" altLang="en-US"/>
+              <a:t>配置</a:t>
+            </a:r>
+            <a:r>
+              <a:rPr lang="en-US" altLang="zh-CN"/>
+              <a:t>Interceptor</a:t>
+            </a:r>
+            <a:r>
+              <a:rPr lang="zh-CN" altLang="en-US"/>
+              <a:t>起作用</a:t>
+            </a:r>
+            <a:endParaRPr lang="zh-CN" altLang="en-US"/>
+          </a:p>
+        </p:txBody>
+      </p:sp>
+    </p:spTree>
+  </p:cSld>
+  <p:clrMapOvr>
+    <a:masterClrMapping/>
+  </p:clrMapOvr>
+</p:notes>
 </file>
 
 <file path=ppt/slideLayouts/slideLayout1.xml><?xml version="1.0" encoding="utf-8"?>
@@ -3050,6 +3299,136 @@
 </p:sld>
 </file>
 
+<file path=ppt/slides/slide10.xml><?xml version="1.0" encoding="utf-8"?>
+<p:sld xmlns:a="http://schemas.openxmlformats.org/drawingml/2006/main" xmlns:r="http://schemas.openxmlformats.org/officeDocument/2006/relationships" xmlns:p="http://schemas.openxmlformats.org/presentationml/2006/main">
+  <p:cSld>
+    <p:spTree>
+      <p:nvGrpSpPr>
+        <p:cNvPr id="1" name=""/>
+        <p:cNvGrpSpPr/>
+        <p:nvPr/>
+      </p:nvGrpSpPr>
+      <p:grpSpPr/>
+      <p:sp>
+        <p:nvSpPr>
+          <p:cNvPr id="2" name="标题 1"/>
+          <p:cNvSpPr>
+            <a:spLocks noGrp="1"/>
+          </p:cNvSpPr>
+          <p:nvPr>
+            <p:ph type="title"/>
+          </p:nvPr>
+        </p:nvSpPr>
+        <p:spPr/>
+        <p:txBody>
+          <a:bodyPr/>
+          <a:p>
+            <a:r>
+              <a:rPr lang="en-US" altLang="zh-CN"/>
+              <a:t>REST API </a:t>
+            </a:r>
+            <a:r>
+              <a:rPr lang="zh-CN" altLang="en-US"/>
+              <a:t>拦截 </a:t>
+            </a:r>
+            <a:r>
+              <a:rPr lang="en-US" altLang="zh-CN"/>
+              <a:t>-- Aspect</a:t>
+            </a:r>
+            <a:endParaRPr lang="en-US" altLang="zh-CN"/>
+          </a:p>
+        </p:txBody>
+      </p:sp>
+      <p:sp>
+        <p:nvSpPr>
+          <p:cNvPr id="3" name="内容占位符 2"/>
+          <p:cNvSpPr>
+            <a:spLocks noGrp="1"/>
+          </p:cNvSpPr>
+          <p:nvPr>
+            <p:ph idx="1"/>
+          </p:nvPr>
+        </p:nvSpPr>
+        <p:spPr/>
+        <p:txBody>
+          <a:bodyPr/>
+          <a:p>
+            <a:r>
+              <a:rPr lang="en-US" altLang="zh-CN"/>
+              <a:t>@ControllerAdvice</a:t>
+            </a:r>
+            <a:endParaRPr lang="en-US" altLang="zh-CN"/>
+          </a:p>
+        </p:txBody>
+      </p:sp>
+    </p:spTree>
+    <p:custDataLst>
+      <p:tags r:id="rId1"/>
+    </p:custDataLst>
+  </p:cSld>
+  <p:clrMapOvr>
+    <a:masterClrMapping/>
+  </p:clrMapOvr>
+</p:sld>
+</file>
+
+<file path=ppt/slides/slide11.xml><?xml version="1.0" encoding="utf-8"?>
+<p:sld xmlns:a="http://schemas.openxmlformats.org/drawingml/2006/main" xmlns:r="http://schemas.openxmlformats.org/officeDocument/2006/relationships" xmlns:p="http://schemas.openxmlformats.org/presentationml/2006/main">
+  <p:cSld>
+    <p:spTree>
+      <p:nvGrpSpPr>
+        <p:cNvPr id="1" name=""/>
+        <p:cNvGrpSpPr/>
+        <p:nvPr/>
+      </p:nvGrpSpPr>
+      <p:grpSpPr/>
+      <p:sp>
+        <p:nvSpPr>
+          <p:cNvPr id="2" name="标题 1"/>
+          <p:cNvSpPr>
+            <a:spLocks noGrp="1"/>
+          </p:cNvSpPr>
+          <p:nvPr>
+            <p:ph type="title"/>
+          </p:nvPr>
+        </p:nvSpPr>
+        <p:spPr/>
+        <p:txBody>
+          <a:bodyPr/>
+          <a:p>
+            <a:endParaRPr lang="zh-CN" altLang="en-US"/>
+          </a:p>
+        </p:txBody>
+      </p:sp>
+      <p:sp>
+        <p:nvSpPr>
+          <p:cNvPr id="3" name="内容占位符 2"/>
+          <p:cNvSpPr>
+            <a:spLocks noGrp="1"/>
+          </p:cNvSpPr>
+          <p:nvPr>
+            <p:ph idx="1"/>
+          </p:nvPr>
+        </p:nvSpPr>
+        <p:spPr/>
+        <p:txBody>
+          <a:bodyPr/>
+          <a:p>
+            <a:endParaRPr lang="zh-CN" altLang="en-US"/>
+          </a:p>
+        </p:txBody>
+      </p:sp>
+    </p:spTree>
+    <p:custDataLst>
+      <p:tags r:id="rId1"/>
+    </p:custDataLst>
+  </p:cSld>
+  <p:clrMapOvr>
+    <a:masterClrMapping/>
+  </p:clrMapOvr>
+</p:sld>
+</file>
+
 <file path=ppt/slides/slide2.xml><?xml version="1.0" encoding="utf-8"?>
 <p:sld xmlns:a="http://schemas.openxmlformats.org/drawingml/2006/main" xmlns:r="http://schemas.openxmlformats.org/officeDocument/2006/relationships" xmlns:p="http://schemas.openxmlformats.org/presentationml/2006/main">
   <p:cSld>
@@ -3237,6 +3616,615 @@
 </p:sld>
 </file>
 
+<file path=ppt/slides/slide4.xml><?xml version="1.0" encoding="utf-8"?>
+<p:sld xmlns:a="http://schemas.openxmlformats.org/drawingml/2006/main" xmlns:r="http://schemas.openxmlformats.org/officeDocument/2006/relationships" xmlns:p="http://schemas.openxmlformats.org/presentationml/2006/main">
+  <p:cSld>
+    <p:spTree>
+      <p:nvGrpSpPr>
+        <p:cNvPr id="1" name=""/>
+        <p:cNvGrpSpPr/>
+        <p:nvPr/>
+      </p:nvGrpSpPr>
+      <p:grpSpPr/>
+      <p:sp>
+        <p:nvSpPr>
+          <p:cNvPr id="2" name="标题 1"/>
+          <p:cNvSpPr>
+            <a:spLocks noGrp="1"/>
+          </p:cNvSpPr>
+          <p:nvPr>
+            <p:ph type="title"/>
+          </p:nvPr>
+        </p:nvSpPr>
+        <p:spPr/>
+        <p:txBody>
+          <a:bodyPr/>
+          <a:p>
+            <a:r>
+              <a:rPr lang="en-US" altLang="zh-CN"/>
+              <a:t>REST API</a:t>
+            </a:r>
+            <a:r>
+              <a:rPr lang="zh-CN" altLang="en-US"/>
+              <a:t>拦截</a:t>
+            </a:r>
+            <a:endParaRPr lang="zh-CN" altLang="en-US"/>
+          </a:p>
+        </p:txBody>
+      </p:sp>
+      <p:sp>
+        <p:nvSpPr>
+          <p:cNvPr id="3" name="内容占位符 2"/>
+          <p:cNvSpPr>
+            <a:spLocks noGrp="1"/>
+          </p:cNvSpPr>
+          <p:nvPr>
+            <p:ph idx="1"/>
+          </p:nvPr>
+        </p:nvSpPr>
+        <p:spPr/>
+        <p:txBody>
+          <a:bodyPr/>
+          <a:p>
+            <a:r>
+              <a:rPr lang="en-US" altLang="zh-CN"/>
+              <a:t>Filter</a:t>
+            </a:r>
+            <a:endParaRPr lang="en-US" altLang="zh-CN"/>
+          </a:p>
+          <a:p>
+            <a:r>
+              <a:rPr lang="en-US" altLang="zh-CN"/>
+              <a:t>Interceptor</a:t>
+            </a:r>
+            <a:endParaRPr lang="en-US" altLang="zh-CN"/>
+          </a:p>
+          <a:p>
+            <a:r>
+              <a:rPr lang="en-US" altLang="zh-CN"/>
+              <a:t>Aspect</a:t>
+            </a:r>
+            <a:endParaRPr lang="en-US" altLang="zh-CN"/>
+          </a:p>
+        </p:txBody>
+      </p:sp>
+    </p:spTree>
+    <p:custDataLst>
+      <p:tags r:id="rId1"/>
+    </p:custDataLst>
+  </p:cSld>
+  <p:clrMapOvr>
+    <a:masterClrMapping/>
+  </p:clrMapOvr>
+</p:sld>
+</file>
+
+<file path=ppt/slides/slide5.xml><?xml version="1.0" encoding="utf-8"?>
+<p:sld xmlns:a="http://schemas.openxmlformats.org/drawingml/2006/main" xmlns:r="http://schemas.openxmlformats.org/officeDocument/2006/relationships" xmlns:p="http://schemas.openxmlformats.org/presentationml/2006/main">
+  <p:cSld>
+    <p:spTree>
+      <p:nvGrpSpPr>
+        <p:cNvPr id="1" name=""/>
+        <p:cNvGrpSpPr/>
+        <p:nvPr/>
+      </p:nvGrpSpPr>
+      <p:grpSpPr/>
+      <p:sp>
+        <p:nvSpPr>
+          <p:cNvPr id="2" name="标题 1"/>
+          <p:cNvSpPr>
+            <a:spLocks noGrp="1"/>
+          </p:cNvSpPr>
+          <p:nvPr>
+            <p:ph type="title"/>
+          </p:nvPr>
+        </p:nvSpPr>
+        <p:spPr/>
+        <p:txBody>
+          <a:bodyPr/>
+          <a:p>
+            <a:r>
+              <a:rPr lang="en-US" altLang="zh-CN"/>
+              <a:t>REST API </a:t>
+            </a:r>
+            <a:r>
+              <a:rPr lang="zh-CN" altLang="en-US"/>
+              <a:t>拦截 </a:t>
+            </a:r>
+            <a:r>
+              <a:rPr lang="en-US" altLang="zh-CN"/>
+              <a:t>-- Filter</a:t>
+            </a:r>
+            <a:endParaRPr lang="en-US" altLang="zh-CN"/>
+          </a:p>
+        </p:txBody>
+      </p:sp>
+      <p:sp>
+        <p:nvSpPr>
+          <p:cNvPr id="3" name="内容占位符 2"/>
+          <p:cNvSpPr>
+            <a:spLocks noGrp="1"/>
+          </p:cNvSpPr>
+          <p:nvPr>
+            <p:ph idx="1"/>
+          </p:nvPr>
+        </p:nvSpPr>
+        <p:spPr/>
+        <p:txBody>
+          <a:bodyPr/>
+          <a:p>
+            <a:r>
+              <a:rPr lang="en-US" altLang="zh-CN"/>
+              <a:t>Filter</a:t>
+            </a:r>
+            <a:endParaRPr lang="en-US" altLang="zh-CN"/>
+          </a:p>
+          <a:p>
+            <a:r>
+              <a:rPr lang="zh-CN" altLang="en-US"/>
+              <a:t>所有</a:t>
+            </a:r>
+            <a:r>
+              <a:rPr lang="en-US" altLang="zh-CN"/>
+              <a:t>Filter</a:t>
+            </a:r>
+            <a:r>
+              <a:rPr lang="zh-CN" altLang="en-US"/>
+              <a:t>都会</a:t>
+            </a:r>
+            <a:r>
+              <a:rPr lang="zh-CN" altLang="en-US"/>
+              <a:t>实现</a:t>
+            </a:r>
+            <a:r>
+              <a:rPr lang="en-US" altLang="zh-CN"/>
+              <a:t>Filter</a:t>
+            </a:r>
+            <a:r>
+              <a:rPr lang="zh-CN" altLang="en-US"/>
+              <a:t>接口</a:t>
+            </a:r>
+            <a:endParaRPr lang="zh-CN" altLang="en-US"/>
+          </a:p>
+          <a:p>
+            <a:r>
+              <a:rPr lang="zh-CN" altLang="en-US"/>
+              <a:t>属于</a:t>
+            </a:r>
+            <a:r>
+              <a:rPr lang="en-US" altLang="zh-CN"/>
+              <a:t>J2EE</a:t>
+            </a:r>
+            <a:r>
+              <a:rPr lang="zh-CN" altLang="en-US"/>
+              <a:t>规范</a:t>
+            </a:r>
+            <a:endParaRPr lang="zh-CN" altLang="en-US"/>
+          </a:p>
+        </p:txBody>
+      </p:sp>
+    </p:spTree>
+    <p:custDataLst>
+      <p:tags r:id="rId1"/>
+    </p:custDataLst>
+  </p:cSld>
+  <p:clrMapOvr>
+    <a:masterClrMapping/>
+  </p:clrMapOvr>
+</p:sld>
+</file>
+
+<file path=ppt/slides/slide6.xml><?xml version="1.0" encoding="utf-8"?>
+<p:sld xmlns:a="http://schemas.openxmlformats.org/drawingml/2006/main" xmlns:r="http://schemas.openxmlformats.org/officeDocument/2006/relationships" xmlns:p="http://schemas.openxmlformats.org/presentationml/2006/main">
+  <p:cSld>
+    <p:spTree>
+      <p:nvGrpSpPr>
+        <p:cNvPr id="1" name=""/>
+        <p:cNvGrpSpPr/>
+        <p:nvPr/>
+      </p:nvGrpSpPr>
+      <p:grpSpPr/>
+      <p:sp>
+        <p:nvSpPr>
+          <p:cNvPr id="2" name="标题 1"/>
+          <p:cNvSpPr>
+            <a:spLocks noGrp="1"/>
+          </p:cNvSpPr>
+          <p:nvPr>
+            <p:ph type="title"/>
+          </p:nvPr>
+        </p:nvSpPr>
+        <p:spPr/>
+        <p:txBody>
+          <a:bodyPr>
+            <a:normAutofit/>
+          </a:bodyPr>
+          <a:p>
+            <a:r>
+              <a:rPr lang="en-US" altLang="zh-CN"/>
+              <a:t>REST API</a:t>
+            </a:r>
+            <a:r>
+              <a:rPr lang="zh-CN" altLang="en-US"/>
+              <a:t>拦截</a:t>
+            </a:r>
+            <a:r>
+              <a:rPr lang="en-US" altLang="zh-CN">
+                <a:sym typeface="+mn-ea"/>
+              </a:rPr>
+              <a:t>-- Filter</a:t>
+            </a:r>
+            <a:endParaRPr lang="zh-CN" altLang="en-US"/>
+          </a:p>
+        </p:txBody>
+      </p:sp>
+      <p:pic>
+        <p:nvPicPr>
+          <p:cNvPr id="4" name="内容占位符 3"/>
+          <p:cNvPicPr>
+            <a:picLocks noChangeAspect="1"/>
+          </p:cNvPicPr>
+          <p:nvPr>
+            <p:ph idx="1"/>
+          </p:nvPr>
+        </p:nvPicPr>
+        <p:blipFill>
+          <a:blip r:embed="rId1"/>
+          <a:stretch>
+            <a:fillRect/>
+          </a:stretch>
+        </p:blipFill>
+        <p:spPr>
+          <a:xfrm>
+            <a:off x="1186180" y="1825625"/>
+            <a:ext cx="9819005" cy="4351655"/>
+          </a:xfrm>
+          <a:prstGeom prst="rect">
+            <a:avLst/>
+          </a:prstGeom>
+        </p:spPr>
+      </p:pic>
+    </p:spTree>
+    <p:custDataLst>
+      <p:tags r:id="rId2"/>
+    </p:custDataLst>
+  </p:cSld>
+  <p:clrMapOvr>
+    <a:masterClrMapping/>
+  </p:clrMapOvr>
+</p:sld>
+</file>
+
+<file path=ppt/slides/slide7.xml><?xml version="1.0" encoding="utf-8"?>
+<p:sld xmlns:a="http://schemas.openxmlformats.org/drawingml/2006/main" xmlns:r="http://schemas.openxmlformats.org/officeDocument/2006/relationships" xmlns:p="http://schemas.openxmlformats.org/presentationml/2006/main">
+  <p:cSld>
+    <p:spTree>
+      <p:nvGrpSpPr>
+        <p:cNvPr id="1" name=""/>
+        <p:cNvGrpSpPr/>
+        <p:nvPr/>
+      </p:nvGrpSpPr>
+      <p:grpSpPr/>
+      <p:sp>
+        <p:nvSpPr>
+          <p:cNvPr id="2" name="标题 1"/>
+          <p:cNvSpPr>
+            <a:spLocks noGrp="1"/>
+          </p:cNvSpPr>
+          <p:nvPr>
+            <p:ph type="title"/>
+          </p:nvPr>
+        </p:nvSpPr>
+        <p:spPr/>
+        <p:txBody>
+          <a:bodyPr>
+            <a:normAutofit/>
+          </a:bodyPr>
+          <a:p>
+            <a:r>
+              <a:rPr lang="en-US" altLang="zh-CN"/>
+              <a:t>REST API</a:t>
+            </a:r>
+            <a:r>
+              <a:rPr lang="zh-CN" altLang="en-US"/>
+              <a:t>拦截 </a:t>
+            </a:r>
+            <a:r>
+              <a:rPr lang="en-US" altLang="zh-CN">
+                <a:sym typeface="+mn-ea"/>
+              </a:rPr>
+              <a:t>-- Filter</a:t>
+            </a:r>
+            <a:endParaRPr lang="zh-CN" altLang="en-US"/>
+          </a:p>
+        </p:txBody>
+      </p:sp>
+      <p:sp>
+        <p:nvSpPr>
+          <p:cNvPr id="5" name="内容占位符 4"/>
+          <p:cNvSpPr/>
+          <p:nvPr>
+            <p:ph idx="1"/>
+          </p:nvPr>
+        </p:nvSpPr>
+        <p:spPr/>
+        <p:txBody>
+          <a:bodyPr/>
+          <a:p>
+            <a:r>
+              <a:rPr lang="zh-CN" altLang="en-US"/>
+              <a:t>使用第三方</a:t>
+            </a:r>
+            <a:r>
+              <a:rPr lang="en-US" altLang="zh-CN"/>
+              <a:t>Filter</a:t>
+            </a:r>
+            <a:endParaRPr lang="en-US" altLang="zh-CN"/>
+          </a:p>
+          <a:p>
+            <a:endParaRPr lang="en-US" altLang="zh-CN"/>
+          </a:p>
+          <a:p>
+            <a:endParaRPr lang="en-US" altLang="zh-CN"/>
+          </a:p>
+          <a:p>
+            <a:endParaRPr lang="en-US" altLang="zh-CN"/>
+          </a:p>
+          <a:p>
+            <a:endParaRPr lang="en-US" altLang="zh-CN"/>
+          </a:p>
+          <a:p>
+            <a:endParaRPr lang="en-US" altLang="zh-CN"/>
+          </a:p>
+          <a:p>
+            <a:r>
+              <a:rPr lang="zh-CN" altLang="en-US"/>
+              <a:t>此种方式还可设置只针对某些</a:t>
+            </a:r>
+            <a:r>
+              <a:rPr lang="en-US" altLang="zh-CN"/>
+              <a:t>URL</a:t>
+            </a:r>
+            <a:r>
+              <a:rPr lang="zh-CN" altLang="en-US"/>
+              <a:t>过滤</a:t>
+            </a:r>
+            <a:endParaRPr lang="zh-CN" altLang="en-US"/>
+          </a:p>
+        </p:txBody>
+      </p:sp>
+      <p:pic>
+        <p:nvPicPr>
+          <p:cNvPr id="6" name="内容占位符 3"/>
+          <p:cNvPicPr>
+            <a:picLocks noChangeAspect="1"/>
+          </p:cNvPicPr>
+          <p:nvPr/>
+        </p:nvPicPr>
+        <p:blipFill>
+          <a:blip r:embed="rId1"/>
+          <a:stretch>
+            <a:fillRect/>
+          </a:stretch>
+        </p:blipFill>
+        <p:spPr>
+          <a:xfrm>
+            <a:off x="1056005" y="2453005"/>
+            <a:ext cx="8020050" cy="2438400"/>
+          </a:xfrm>
+          <a:prstGeom prst="rect">
+            <a:avLst/>
+          </a:prstGeom>
+        </p:spPr>
+      </p:pic>
+    </p:spTree>
+    <p:custDataLst>
+      <p:tags r:id="rId2"/>
+    </p:custDataLst>
+  </p:cSld>
+  <p:clrMapOvr>
+    <a:masterClrMapping/>
+  </p:clrMapOvr>
+</p:sld>
+</file>
+
+<file path=ppt/slides/slide8.xml><?xml version="1.0" encoding="utf-8"?>
+<p:sld xmlns:a="http://schemas.openxmlformats.org/drawingml/2006/main" xmlns:r="http://schemas.openxmlformats.org/officeDocument/2006/relationships" xmlns:p="http://schemas.openxmlformats.org/presentationml/2006/main">
+  <p:cSld>
+    <p:spTree>
+      <p:nvGrpSpPr>
+        <p:cNvPr id="1" name=""/>
+        <p:cNvGrpSpPr/>
+        <p:nvPr/>
+      </p:nvGrpSpPr>
+      <p:grpSpPr/>
+      <p:sp>
+        <p:nvSpPr>
+          <p:cNvPr id="2" name="标题 1"/>
+          <p:cNvSpPr>
+            <a:spLocks noGrp="1"/>
+          </p:cNvSpPr>
+          <p:nvPr>
+            <p:ph type="title"/>
+          </p:nvPr>
+        </p:nvSpPr>
+        <p:spPr/>
+        <p:txBody>
+          <a:bodyPr/>
+          <a:p>
+            <a:r>
+              <a:rPr lang="en-US" altLang="zh-CN"/>
+              <a:t>REST API </a:t>
+            </a:r>
+            <a:r>
+              <a:rPr lang="zh-CN" altLang="en-US"/>
+              <a:t>拦截 </a:t>
+            </a:r>
+            <a:r>
+              <a:rPr lang="en-US" altLang="zh-CN"/>
+              <a:t>-- Interceptor</a:t>
+            </a:r>
+            <a:endParaRPr lang="en-US" altLang="zh-CN"/>
+          </a:p>
+        </p:txBody>
+      </p:sp>
+      <p:sp>
+        <p:nvSpPr>
+          <p:cNvPr id="3" name="内容占位符 2"/>
+          <p:cNvSpPr>
+            <a:spLocks noGrp="1"/>
+          </p:cNvSpPr>
+          <p:nvPr>
+            <p:ph idx="1"/>
+          </p:nvPr>
+        </p:nvSpPr>
+        <p:spPr/>
+        <p:txBody>
+          <a:bodyPr/>
+          <a:p>
+            <a:r>
+              <a:rPr lang="en-US" altLang="zh-CN"/>
+              <a:t>Spring</a:t>
+            </a:r>
+            <a:r>
+              <a:rPr lang="zh-CN" altLang="en-US"/>
+              <a:t>提供非</a:t>
+            </a:r>
+            <a:r>
+              <a:rPr lang="en-US" altLang="zh-CN"/>
+              <a:t>J2EE</a:t>
+            </a:r>
+            <a:r>
+              <a:rPr lang="zh-CN" altLang="en-US"/>
+              <a:t>规范</a:t>
+            </a:r>
+            <a:endParaRPr lang="zh-CN" altLang="en-US"/>
+          </a:p>
+          <a:p>
+            <a:endParaRPr lang="zh-CN" altLang="en-US"/>
+          </a:p>
+        </p:txBody>
+      </p:sp>
+      <p:pic>
+        <p:nvPicPr>
+          <p:cNvPr id="4" name="图片 3"/>
+          <p:cNvPicPr>
+            <a:picLocks noChangeAspect="1"/>
+          </p:cNvPicPr>
+          <p:nvPr/>
+        </p:nvPicPr>
+        <p:blipFill>
+          <a:blip r:embed="rId1"/>
+          <a:stretch>
+            <a:fillRect/>
+          </a:stretch>
+        </p:blipFill>
+        <p:spPr>
+          <a:xfrm>
+            <a:off x="1099185" y="2554605"/>
+            <a:ext cx="9857740" cy="3961130"/>
+          </a:xfrm>
+          <a:prstGeom prst="rect">
+            <a:avLst/>
+          </a:prstGeom>
+        </p:spPr>
+      </p:pic>
+    </p:spTree>
+    <p:custDataLst>
+      <p:tags r:id="rId2"/>
+    </p:custDataLst>
+  </p:cSld>
+  <p:clrMapOvr>
+    <a:masterClrMapping/>
+  </p:clrMapOvr>
+</p:sld>
+</file>
+
+<file path=ppt/slides/slide9.xml><?xml version="1.0" encoding="utf-8"?>
+<p:sld xmlns:a="http://schemas.openxmlformats.org/drawingml/2006/main" xmlns:r="http://schemas.openxmlformats.org/officeDocument/2006/relationships" xmlns:p="http://schemas.openxmlformats.org/presentationml/2006/main">
+  <p:cSld>
+    <p:spTree>
+      <p:nvGrpSpPr>
+        <p:cNvPr id="1" name=""/>
+        <p:cNvGrpSpPr/>
+        <p:nvPr/>
+      </p:nvGrpSpPr>
+      <p:grpSpPr/>
+      <p:sp>
+        <p:nvSpPr>
+          <p:cNvPr id="2" name="标题 1"/>
+          <p:cNvSpPr>
+            <a:spLocks noGrp="1"/>
+          </p:cNvSpPr>
+          <p:nvPr>
+            <p:ph type="title"/>
+          </p:nvPr>
+        </p:nvSpPr>
+        <p:spPr/>
+        <p:txBody>
+          <a:bodyPr>
+            <a:normAutofit/>
+          </a:bodyPr>
+          <a:p>
+            <a:r>
+              <a:rPr lang="en-US" altLang="zh-CN">
+                <a:sym typeface="+mn-ea"/>
+              </a:rPr>
+              <a:t>REST API </a:t>
+            </a:r>
+            <a:r>
+              <a:rPr lang="zh-CN" altLang="en-US">
+                <a:sym typeface="+mn-ea"/>
+              </a:rPr>
+              <a:t>拦截 </a:t>
+            </a:r>
+            <a:r>
+              <a:rPr lang="en-US" altLang="zh-CN">
+                <a:sym typeface="+mn-ea"/>
+              </a:rPr>
+              <a:t>-- Interceptor</a:t>
+            </a:r>
+            <a:endParaRPr lang="zh-CN" altLang="en-US"/>
+          </a:p>
+        </p:txBody>
+      </p:sp>
+      <p:pic>
+        <p:nvPicPr>
+          <p:cNvPr id="4" name="内容占位符 3"/>
+          <p:cNvPicPr>
+            <a:picLocks noChangeAspect="1"/>
+          </p:cNvPicPr>
+          <p:nvPr>
+            <p:ph idx="1"/>
+          </p:nvPr>
+        </p:nvPicPr>
+        <p:blipFill>
+          <a:blip r:embed="rId1"/>
+          <a:stretch>
+            <a:fillRect/>
+          </a:stretch>
+        </p:blipFill>
+        <p:spPr>
+          <a:xfrm>
+            <a:off x="2290445" y="2924810"/>
+            <a:ext cx="7610475" cy="2152650"/>
+          </a:xfrm>
+          <a:prstGeom prst="rect">
+            <a:avLst/>
+          </a:prstGeom>
+        </p:spPr>
+      </p:pic>
+    </p:spTree>
+    <p:custDataLst>
+      <p:tags r:id="rId2"/>
+    </p:custDataLst>
+  </p:cSld>
+  <p:clrMapOvr>
+    <a:masterClrMapping/>
+  </p:clrMapOvr>
+</p:sld>
+</file>
+
 <file path=ppt/tags/tag1.xml><?xml version="1.0" encoding="utf-8"?>
 <p:tagLst xmlns:p="http://schemas.openxmlformats.org/presentationml/2006/main">
   <p:tag name="KSO_WM_TAG_VERSION" val="1.0"/>
@@ -3246,6 +4234,70 @@
 </file>
 
 <file path=ppt/tags/tag10.xml><?xml version="1.0" encoding="utf-8"?>
+<p:tagLst xmlns:p="http://schemas.openxmlformats.org/presentationml/2006/main">
+  <p:tag name="KSO_WM_BEAUTIFY_FLAG" val="#wm#"/>
+  <p:tag name="KSO_WM_TEMPLATE_CATEGORY" val="custom"/>
+  <p:tag name="KSO_WM_TEMPLATE_INDEX" val="20184554"/>
+</p:tagLst>
+</file>
+
+<file path=ppt/tags/tag11.xml><?xml version="1.0" encoding="utf-8"?>
+<p:tagLst xmlns:p="http://schemas.openxmlformats.org/presentationml/2006/main">
+  <p:tag name="KSO_WM_BEAUTIFY_FLAG" val="#wm#"/>
+  <p:tag name="KSO_WM_TEMPLATE_CATEGORY" val="custom"/>
+  <p:tag name="KSO_WM_TEMPLATE_INDEX" val="20184554"/>
+</p:tagLst>
+</file>
+
+<file path=ppt/tags/tag12.xml><?xml version="1.0" encoding="utf-8"?>
+<p:tagLst xmlns:p="http://schemas.openxmlformats.org/presentationml/2006/main">
+  <p:tag name="KSO_WM_BEAUTIFY_FLAG" val="#wm#"/>
+  <p:tag name="KSO_WM_TEMPLATE_CATEGORY" val="custom"/>
+  <p:tag name="KSO_WM_TEMPLATE_INDEX" val="20184554"/>
+</p:tagLst>
+</file>
+
+<file path=ppt/tags/tag13.xml><?xml version="1.0" encoding="utf-8"?>
+<p:tagLst xmlns:p="http://schemas.openxmlformats.org/presentationml/2006/main">
+  <p:tag name="KSO_WM_BEAUTIFY_FLAG" val="#wm#"/>
+  <p:tag name="KSO_WM_TEMPLATE_CATEGORY" val="custom"/>
+  <p:tag name="KSO_WM_TEMPLATE_INDEX" val="20184554"/>
+</p:tagLst>
+</file>
+
+<file path=ppt/tags/tag14.xml><?xml version="1.0" encoding="utf-8"?>
+<p:tagLst xmlns:p="http://schemas.openxmlformats.org/presentationml/2006/main">
+  <p:tag name="KSO_WM_BEAUTIFY_FLAG" val="#wm#"/>
+  <p:tag name="KSO_WM_TEMPLATE_CATEGORY" val="custom"/>
+  <p:tag name="KSO_WM_TEMPLATE_INDEX" val="20184554"/>
+</p:tagLst>
+</file>
+
+<file path=ppt/tags/tag15.xml><?xml version="1.0" encoding="utf-8"?>
+<p:tagLst xmlns:p="http://schemas.openxmlformats.org/presentationml/2006/main">
+  <p:tag name="KSO_WM_BEAUTIFY_FLAG" val="#wm#"/>
+  <p:tag name="KSO_WM_TEMPLATE_CATEGORY" val="custom"/>
+  <p:tag name="KSO_WM_TEMPLATE_INDEX" val="20184554"/>
+</p:tagLst>
+</file>
+
+<file path=ppt/tags/tag16.xml><?xml version="1.0" encoding="utf-8"?>
+<p:tagLst xmlns:p="http://schemas.openxmlformats.org/presentationml/2006/main">
+  <p:tag name="KSO_WM_BEAUTIFY_FLAG" val="#wm#"/>
+  <p:tag name="KSO_WM_TEMPLATE_CATEGORY" val="custom"/>
+  <p:tag name="KSO_WM_TEMPLATE_INDEX" val="20184554"/>
+</p:tagLst>
+</file>
+
+<file path=ppt/tags/tag17.xml><?xml version="1.0" encoding="utf-8"?>
+<p:tagLst xmlns:p="http://schemas.openxmlformats.org/presentationml/2006/main">
+  <p:tag name="KSO_WM_BEAUTIFY_FLAG" val="#wm#"/>
+  <p:tag name="KSO_WM_TEMPLATE_CATEGORY" val="custom"/>
+  <p:tag name="KSO_WM_TEMPLATE_INDEX" val="20184554"/>
+</p:tagLst>
+</file>
+
+<file path=ppt/tags/tag18.xml><?xml version="1.0" encoding="utf-8"?>
 <p:tagLst xmlns:p="http://schemas.openxmlformats.org/presentationml/2006/main">
   <p:tag name="KSO_WM_BEAUTIFY_FLAG" val="#wm#"/>
   <p:tag name="KSO_WM_TEMPLATE_CATEGORY" val="custom"/>

</xml_diff>

<commit_message>
added log hot configuration demo projects
</commit_message>
<xml_diff>
--- a/FirstDemo/SpringBootIntroduction.pptx
+++ b/FirstDemo/SpringBootIntroduction.pptx
@@ -3355,7 +3355,7 @@
           <a:p>
             <a:r>
               <a:rPr lang="en-US" altLang="zh-CN"/>
-              <a:t>@ControllerAdvice</a:t>
+              <a:t>@RestControllerAdvice + @ExceptionHandler</a:t>
             </a:r>
             <a:endParaRPr lang="en-US" altLang="zh-CN"/>
           </a:p>
@@ -3770,11 +3770,7 @@
             </a:r>
             <a:r>
               <a:rPr lang="zh-CN" altLang="en-US"/>
-              <a:t>都会</a:t>
-            </a:r>
-            <a:r>
-              <a:rPr lang="zh-CN" altLang="en-US"/>
-              <a:t>实现</a:t>
+              <a:t>都会实现</a:t>
             </a:r>
             <a:r>
               <a:rPr lang="en-US" altLang="zh-CN"/>

</xml_diff>